<commit_message>
Material do 3 Modulo
</commit_message>
<xml_diff>
--- a/Slides/Fundamentos em Arquitetura de Software com C# - Modulo 2.pptx
+++ b/Slides/Fundamentos em Arquitetura de Software com C# - Modulo 2.pptx
@@ -1515,6 +1515,594 @@
       <dsp:cNvGrpSpPr/>
     </dsp:nvGrpSpPr>
     <dsp:grpSpPr/>
+    <dsp:sp modelId="{BDBCD96D-EE08-4676-B252-D2D8DA81DAF8}">
+      <dsp:nvSpPr>
+        <dsp:cNvPr id="0" name=""/>
+        <dsp:cNvSpPr/>
+      </dsp:nvSpPr>
+      <dsp:spPr>
+        <a:xfrm>
+          <a:off x="2515483" y="244"/>
+          <a:ext cx="1490185" cy="1490185"/>
+        </a:xfrm>
+        <a:prstGeom prst="ellipse">
+          <a:avLst/>
+        </a:prstGeom>
+        <a:solidFill>
+          <a:schemeClr val="accent4">
+            <a:hueOff val="0"/>
+            <a:satOff val="0"/>
+            <a:lumOff val="0"/>
+            <a:alphaOff val="0"/>
+          </a:schemeClr>
+        </a:solidFill>
+        <a:ln w="19050" cap="flat" cmpd="sng" algn="ctr">
+          <a:solidFill>
+            <a:schemeClr val="lt1">
+              <a:hueOff val="0"/>
+              <a:satOff val="0"/>
+              <a:lumOff val="0"/>
+              <a:alphaOff val="0"/>
+            </a:schemeClr>
+          </a:solidFill>
+          <a:prstDash val="solid"/>
+          <a:miter lim="800000"/>
+        </a:ln>
+        <a:effectLst/>
+      </dsp:spPr>
+      <dsp:style>
+        <a:lnRef idx="3">
+          <a:scrgbClr r="0" g="0" b="0"/>
+        </a:lnRef>
+        <a:fillRef idx="1">
+          <a:scrgbClr r="0" g="0" b="0"/>
+        </a:fillRef>
+        <a:effectRef idx="1">
+          <a:scrgbClr r="0" g="0" b="0"/>
+        </a:effectRef>
+        <a:fontRef idx="minor">
+          <a:schemeClr val="lt1"/>
+        </a:fontRef>
+      </dsp:style>
+      <dsp:txBody>
+        <a:bodyPr spcFirstLastPara="0" vert="horz" wrap="square" lIns="20320" tIns="20320" rIns="20320" bIns="20320" numCol="1" spcCol="1270" anchor="ctr" anchorCtr="0">
+          <a:noAutofit/>
+        </a:bodyPr>
+        <a:lstStyle/>
+        <a:p>
+          <a:pPr lvl="0" algn="ctr" defTabSz="711200">
+            <a:lnSpc>
+              <a:spcPct val="90000"/>
+            </a:lnSpc>
+            <a:spcBef>
+              <a:spcPct val="0"/>
+            </a:spcBef>
+            <a:spcAft>
+              <a:spcPct val="35000"/>
+            </a:spcAft>
+          </a:pPr>
+          <a:r>
+            <a:rPr lang="pt-BR" sz="1600" kern="1200" dirty="0" smtClean="0"/>
+            <a:t>Criar um teste</a:t>
+          </a:r>
+          <a:endParaRPr lang="pt-BR" sz="1600" kern="1200" dirty="0"/>
+        </a:p>
+      </dsp:txBody>
+      <dsp:txXfrm>
+        <a:off x="2733716" y="218477"/>
+        <a:ext cx="1053719" cy="1053719"/>
+      </dsp:txXfrm>
+    </dsp:sp>
+    <dsp:sp modelId="{F9DF094C-F8FC-4837-AE8D-BC8A4973C1E7}">
+      <dsp:nvSpPr>
+        <dsp:cNvPr id="0" name=""/>
+        <dsp:cNvSpPr/>
+      </dsp:nvSpPr>
+      <dsp:spPr>
+        <a:xfrm rot="2700000">
+          <a:off x="3845767" y="1277374"/>
+          <a:ext cx="396628" cy="502937"/>
+        </a:xfrm>
+        <a:prstGeom prst="rightArrow">
+          <a:avLst>
+            <a:gd name="adj1" fmla="val 60000"/>
+            <a:gd name="adj2" fmla="val 50000"/>
+          </a:avLst>
+        </a:prstGeom>
+        <a:solidFill>
+          <a:schemeClr val="accent4">
+            <a:hueOff val="0"/>
+            <a:satOff val="0"/>
+            <a:lumOff val="0"/>
+            <a:alphaOff val="0"/>
+          </a:schemeClr>
+        </a:solidFill>
+        <a:ln>
+          <a:noFill/>
+        </a:ln>
+        <a:effectLst/>
+      </dsp:spPr>
+      <dsp:style>
+        <a:lnRef idx="0">
+          <a:scrgbClr r="0" g="0" b="0"/>
+        </a:lnRef>
+        <a:fillRef idx="1">
+          <a:scrgbClr r="0" g="0" b="0"/>
+        </a:fillRef>
+        <a:effectRef idx="1">
+          <a:scrgbClr r="0" g="0" b="0"/>
+        </a:effectRef>
+        <a:fontRef idx="minor">
+          <a:schemeClr val="lt1"/>
+        </a:fontRef>
+      </dsp:style>
+      <dsp:txBody>
+        <a:bodyPr spcFirstLastPara="0" vert="horz" wrap="square" lIns="0" tIns="0" rIns="0" bIns="0" numCol="1" spcCol="1270" anchor="ctr" anchorCtr="0">
+          <a:noAutofit/>
+        </a:bodyPr>
+        <a:lstStyle/>
+        <a:p>
+          <a:pPr lvl="0" algn="ctr" defTabSz="577850">
+            <a:lnSpc>
+              <a:spcPct val="90000"/>
+            </a:lnSpc>
+            <a:spcBef>
+              <a:spcPct val="0"/>
+            </a:spcBef>
+            <a:spcAft>
+              <a:spcPct val="35000"/>
+            </a:spcAft>
+          </a:pPr>
+          <a:endParaRPr lang="pt-BR" sz="1300" kern="1200"/>
+        </a:p>
+      </dsp:txBody>
+      <dsp:txXfrm>
+        <a:off x="3863192" y="1335892"/>
+        <a:ext cx="277640" cy="301763"/>
+      </dsp:txXfrm>
+    </dsp:sp>
+    <dsp:sp modelId="{24839DFE-D1DA-41EC-BD3F-4408797FA3B1}">
+      <dsp:nvSpPr>
+        <dsp:cNvPr id="0" name=""/>
+        <dsp:cNvSpPr/>
+      </dsp:nvSpPr>
+      <dsp:spPr>
+        <a:xfrm>
+          <a:off x="4098371" y="1583132"/>
+          <a:ext cx="1490185" cy="1490185"/>
+        </a:xfrm>
+        <a:prstGeom prst="ellipse">
+          <a:avLst/>
+        </a:prstGeom>
+        <a:solidFill>
+          <a:schemeClr val="accent4">
+            <a:hueOff val="3465231"/>
+            <a:satOff val="-15989"/>
+            <a:lumOff val="588"/>
+            <a:alphaOff val="0"/>
+          </a:schemeClr>
+        </a:solidFill>
+        <a:ln w="19050" cap="flat" cmpd="sng" algn="ctr">
+          <a:solidFill>
+            <a:schemeClr val="lt1">
+              <a:hueOff val="0"/>
+              <a:satOff val="0"/>
+              <a:lumOff val="0"/>
+              <a:alphaOff val="0"/>
+            </a:schemeClr>
+          </a:solidFill>
+          <a:prstDash val="solid"/>
+          <a:miter lim="800000"/>
+        </a:ln>
+        <a:effectLst/>
+      </dsp:spPr>
+      <dsp:style>
+        <a:lnRef idx="3">
+          <a:scrgbClr r="0" g="0" b="0"/>
+        </a:lnRef>
+        <a:fillRef idx="1">
+          <a:scrgbClr r="0" g="0" b="0"/>
+        </a:fillRef>
+        <a:effectRef idx="1">
+          <a:scrgbClr r="0" g="0" b="0"/>
+        </a:effectRef>
+        <a:fontRef idx="minor">
+          <a:schemeClr val="lt1"/>
+        </a:fontRef>
+      </dsp:style>
+      <dsp:txBody>
+        <a:bodyPr spcFirstLastPara="0" vert="horz" wrap="square" lIns="20320" tIns="20320" rIns="20320" bIns="20320" numCol="1" spcCol="1270" anchor="ctr" anchorCtr="0">
+          <a:noAutofit/>
+        </a:bodyPr>
+        <a:lstStyle/>
+        <a:p>
+          <a:pPr lvl="0" algn="ctr" defTabSz="711200">
+            <a:lnSpc>
+              <a:spcPct val="90000"/>
+            </a:lnSpc>
+            <a:spcBef>
+              <a:spcPct val="0"/>
+            </a:spcBef>
+            <a:spcAft>
+              <a:spcPct val="35000"/>
+            </a:spcAft>
+          </a:pPr>
+          <a:r>
+            <a:rPr lang="pt-BR" sz="1600" kern="1200" dirty="0" smtClean="0"/>
+            <a:t> Rodar o teste</a:t>
+          </a:r>
+          <a:endParaRPr lang="pt-BR" sz="1600" kern="1200" dirty="0"/>
+        </a:p>
+      </dsp:txBody>
+      <dsp:txXfrm>
+        <a:off x="4316604" y="1801365"/>
+        <a:ext cx="1053719" cy="1053719"/>
+      </dsp:txXfrm>
+    </dsp:sp>
+    <dsp:sp modelId="{0FA284E9-2FB6-4FAA-847E-A7E1101931A8}">
+      <dsp:nvSpPr>
+        <dsp:cNvPr id="0" name=""/>
+        <dsp:cNvSpPr/>
+      </dsp:nvSpPr>
+      <dsp:spPr>
+        <a:xfrm rot="8100000">
+          <a:off x="3861642" y="2860262"/>
+          <a:ext cx="396628" cy="502937"/>
+        </a:xfrm>
+        <a:prstGeom prst="rightArrow">
+          <a:avLst>
+            <a:gd name="adj1" fmla="val 60000"/>
+            <a:gd name="adj2" fmla="val 50000"/>
+          </a:avLst>
+        </a:prstGeom>
+        <a:solidFill>
+          <a:schemeClr val="accent4">
+            <a:hueOff val="3465231"/>
+            <a:satOff val="-15989"/>
+            <a:lumOff val="588"/>
+            <a:alphaOff val="0"/>
+          </a:schemeClr>
+        </a:solidFill>
+        <a:ln>
+          <a:noFill/>
+        </a:ln>
+        <a:effectLst/>
+      </dsp:spPr>
+      <dsp:style>
+        <a:lnRef idx="0">
+          <a:scrgbClr r="0" g="0" b="0"/>
+        </a:lnRef>
+        <a:fillRef idx="1">
+          <a:scrgbClr r="0" g="0" b="0"/>
+        </a:fillRef>
+        <a:effectRef idx="1">
+          <a:scrgbClr r="0" g="0" b="0"/>
+        </a:effectRef>
+        <a:fontRef idx="minor">
+          <a:schemeClr val="lt1"/>
+        </a:fontRef>
+      </dsp:style>
+      <dsp:txBody>
+        <a:bodyPr spcFirstLastPara="0" vert="horz" wrap="square" lIns="0" tIns="0" rIns="0" bIns="0" numCol="1" spcCol="1270" anchor="ctr" anchorCtr="0">
+          <a:noAutofit/>
+        </a:bodyPr>
+        <a:lstStyle/>
+        <a:p>
+          <a:pPr lvl="0" algn="ctr" defTabSz="577850">
+            <a:lnSpc>
+              <a:spcPct val="90000"/>
+            </a:lnSpc>
+            <a:spcBef>
+              <a:spcPct val="0"/>
+            </a:spcBef>
+            <a:spcAft>
+              <a:spcPct val="35000"/>
+            </a:spcAft>
+          </a:pPr>
+          <a:endParaRPr lang="pt-BR" sz="1300" kern="1200"/>
+        </a:p>
+      </dsp:txBody>
+      <dsp:txXfrm rot="10800000">
+        <a:off x="3963205" y="2918780"/>
+        <a:ext cx="277640" cy="301763"/>
+      </dsp:txXfrm>
+    </dsp:sp>
+    <dsp:sp modelId="{755E8FAB-1DB2-4EA3-A03A-7A6F1F79DEE6}">
+      <dsp:nvSpPr>
+        <dsp:cNvPr id="0" name=""/>
+        <dsp:cNvSpPr/>
+      </dsp:nvSpPr>
+      <dsp:spPr>
+        <a:xfrm>
+          <a:off x="2515483" y="3166020"/>
+          <a:ext cx="1490185" cy="1490185"/>
+        </a:xfrm>
+        <a:prstGeom prst="ellipse">
+          <a:avLst/>
+        </a:prstGeom>
+        <a:solidFill>
+          <a:schemeClr val="accent4">
+            <a:hueOff val="6930461"/>
+            <a:satOff val="-31979"/>
+            <a:lumOff val="1177"/>
+            <a:alphaOff val="0"/>
+          </a:schemeClr>
+        </a:solidFill>
+        <a:ln w="19050" cap="flat" cmpd="sng" algn="ctr">
+          <a:solidFill>
+            <a:schemeClr val="lt1">
+              <a:hueOff val="0"/>
+              <a:satOff val="0"/>
+              <a:lumOff val="0"/>
+              <a:alphaOff val="0"/>
+            </a:schemeClr>
+          </a:solidFill>
+          <a:prstDash val="solid"/>
+          <a:miter lim="800000"/>
+        </a:ln>
+        <a:effectLst/>
+      </dsp:spPr>
+      <dsp:style>
+        <a:lnRef idx="3">
+          <a:scrgbClr r="0" g="0" b="0"/>
+        </a:lnRef>
+        <a:fillRef idx="1">
+          <a:scrgbClr r="0" g="0" b="0"/>
+        </a:fillRef>
+        <a:effectRef idx="1">
+          <a:scrgbClr r="0" g="0" b="0"/>
+        </a:effectRef>
+        <a:fontRef idx="minor">
+          <a:schemeClr val="lt1"/>
+        </a:fontRef>
+      </dsp:style>
+      <dsp:txBody>
+        <a:bodyPr spcFirstLastPara="0" vert="horz" wrap="square" lIns="20320" tIns="20320" rIns="20320" bIns="20320" numCol="1" spcCol="1270" anchor="ctr" anchorCtr="0">
+          <a:noAutofit/>
+        </a:bodyPr>
+        <a:lstStyle/>
+        <a:p>
+          <a:pPr lvl="0" algn="ctr" defTabSz="711200">
+            <a:lnSpc>
+              <a:spcPct val="90000"/>
+            </a:lnSpc>
+            <a:spcBef>
+              <a:spcPct val="0"/>
+            </a:spcBef>
+            <a:spcAft>
+              <a:spcPct val="35000"/>
+            </a:spcAft>
+          </a:pPr>
+          <a:r>
+            <a:rPr lang="pt-BR" sz="1600" kern="1200" dirty="0" smtClean="0"/>
+            <a:t>Realizar </a:t>
+          </a:r>
+          <a:r>
+            <a:rPr lang="pt-BR" sz="1600" kern="1200" dirty="0" err="1" smtClean="0"/>
+            <a:t>refactoring</a:t>
+          </a:r>
+          <a:endParaRPr lang="pt-BR" sz="1600" kern="1200" dirty="0"/>
+        </a:p>
+      </dsp:txBody>
+      <dsp:txXfrm>
+        <a:off x="2733716" y="3384253"/>
+        <a:ext cx="1053719" cy="1053719"/>
+      </dsp:txXfrm>
+    </dsp:sp>
+    <dsp:sp modelId="{CF486008-9BC7-4557-9CE7-3F2DF53F750C}">
+      <dsp:nvSpPr>
+        <dsp:cNvPr id="0" name=""/>
+        <dsp:cNvSpPr/>
+      </dsp:nvSpPr>
+      <dsp:spPr>
+        <a:xfrm rot="13500000">
+          <a:off x="2278755" y="2876137"/>
+          <a:ext cx="396628" cy="502937"/>
+        </a:xfrm>
+        <a:prstGeom prst="rightArrow">
+          <a:avLst>
+            <a:gd name="adj1" fmla="val 60000"/>
+            <a:gd name="adj2" fmla="val 50000"/>
+          </a:avLst>
+        </a:prstGeom>
+        <a:solidFill>
+          <a:schemeClr val="accent4">
+            <a:hueOff val="6930461"/>
+            <a:satOff val="-31979"/>
+            <a:lumOff val="1177"/>
+            <a:alphaOff val="0"/>
+          </a:schemeClr>
+        </a:solidFill>
+        <a:ln>
+          <a:noFill/>
+        </a:ln>
+        <a:effectLst/>
+      </dsp:spPr>
+      <dsp:style>
+        <a:lnRef idx="0">
+          <a:scrgbClr r="0" g="0" b="0"/>
+        </a:lnRef>
+        <a:fillRef idx="1">
+          <a:scrgbClr r="0" g="0" b="0"/>
+        </a:fillRef>
+        <a:effectRef idx="1">
+          <a:scrgbClr r="0" g="0" b="0"/>
+        </a:effectRef>
+        <a:fontRef idx="minor">
+          <a:schemeClr val="lt1"/>
+        </a:fontRef>
+      </dsp:style>
+      <dsp:txBody>
+        <a:bodyPr spcFirstLastPara="0" vert="horz" wrap="square" lIns="0" tIns="0" rIns="0" bIns="0" numCol="1" spcCol="1270" anchor="ctr" anchorCtr="0">
+          <a:noAutofit/>
+        </a:bodyPr>
+        <a:lstStyle/>
+        <a:p>
+          <a:pPr lvl="0" algn="ctr" defTabSz="577850">
+            <a:lnSpc>
+              <a:spcPct val="90000"/>
+            </a:lnSpc>
+            <a:spcBef>
+              <a:spcPct val="0"/>
+            </a:spcBef>
+            <a:spcAft>
+              <a:spcPct val="35000"/>
+            </a:spcAft>
+          </a:pPr>
+          <a:endParaRPr lang="pt-BR" sz="1300" kern="1200"/>
+        </a:p>
+      </dsp:txBody>
+      <dsp:txXfrm rot="10800000">
+        <a:off x="2380318" y="3018793"/>
+        <a:ext cx="277640" cy="301763"/>
+      </dsp:txXfrm>
+    </dsp:sp>
+    <dsp:sp modelId="{4E423C09-9D7A-4C68-BDDF-102C9A10763A}">
+      <dsp:nvSpPr>
+        <dsp:cNvPr id="0" name=""/>
+        <dsp:cNvSpPr/>
+      </dsp:nvSpPr>
+      <dsp:spPr>
+        <a:xfrm>
+          <a:off x="932595" y="1583132"/>
+          <a:ext cx="1490185" cy="1490185"/>
+        </a:xfrm>
+        <a:prstGeom prst="ellipse">
+          <a:avLst/>
+        </a:prstGeom>
+        <a:solidFill>
+          <a:schemeClr val="accent4">
+            <a:hueOff val="10395692"/>
+            <a:satOff val="-47968"/>
+            <a:lumOff val="1765"/>
+            <a:alphaOff val="0"/>
+          </a:schemeClr>
+        </a:solidFill>
+        <a:ln w="19050" cap="flat" cmpd="sng" algn="ctr">
+          <a:solidFill>
+            <a:schemeClr val="lt1">
+              <a:hueOff val="0"/>
+              <a:satOff val="0"/>
+              <a:lumOff val="0"/>
+              <a:alphaOff val="0"/>
+            </a:schemeClr>
+          </a:solidFill>
+          <a:prstDash val="solid"/>
+          <a:miter lim="800000"/>
+        </a:ln>
+        <a:effectLst/>
+      </dsp:spPr>
+      <dsp:style>
+        <a:lnRef idx="3">
+          <a:scrgbClr r="0" g="0" b="0"/>
+        </a:lnRef>
+        <a:fillRef idx="1">
+          <a:scrgbClr r="0" g="0" b="0"/>
+        </a:fillRef>
+        <a:effectRef idx="1">
+          <a:scrgbClr r="0" g="0" b="0"/>
+        </a:effectRef>
+        <a:fontRef idx="minor">
+          <a:schemeClr val="lt1"/>
+        </a:fontRef>
+      </dsp:style>
+      <dsp:txBody>
+        <a:bodyPr spcFirstLastPara="0" vert="horz" wrap="square" lIns="20320" tIns="20320" rIns="20320" bIns="20320" numCol="1" spcCol="1270" anchor="ctr" anchorCtr="0">
+          <a:noAutofit/>
+        </a:bodyPr>
+        <a:lstStyle/>
+        <a:p>
+          <a:pPr lvl="0" algn="ctr" defTabSz="711200">
+            <a:lnSpc>
+              <a:spcPct val="90000"/>
+            </a:lnSpc>
+            <a:spcBef>
+              <a:spcPct val="0"/>
+            </a:spcBef>
+            <a:spcAft>
+              <a:spcPct val="35000"/>
+            </a:spcAft>
+          </a:pPr>
+          <a:r>
+            <a:rPr lang="pt-BR" sz="1600" kern="1200" dirty="0" smtClean="0"/>
+            <a:t>Rodar o teste</a:t>
+          </a:r>
+          <a:endParaRPr lang="pt-BR" sz="1600" kern="1200" dirty="0"/>
+        </a:p>
+      </dsp:txBody>
+      <dsp:txXfrm>
+        <a:off x="1150828" y="1801365"/>
+        <a:ext cx="1053719" cy="1053719"/>
+      </dsp:txXfrm>
+    </dsp:sp>
+    <dsp:sp modelId="{3D437D27-BD42-409B-B4F2-68999AFBAC89}">
+      <dsp:nvSpPr>
+        <dsp:cNvPr id="0" name=""/>
+        <dsp:cNvSpPr/>
+      </dsp:nvSpPr>
+      <dsp:spPr>
+        <a:xfrm rot="18900000">
+          <a:off x="2262880" y="1293249"/>
+          <a:ext cx="396628" cy="502937"/>
+        </a:xfrm>
+        <a:prstGeom prst="rightArrow">
+          <a:avLst>
+            <a:gd name="adj1" fmla="val 60000"/>
+            <a:gd name="adj2" fmla="val 50000"/>
+          </a:avLst>
+        </a:prstGeom>
+        <a:solidFill>
+          <a:schemeClr val="accent4">
+            <a:hueOff val="10395692"/>
+            <a:satOff val="-47968"/>
+            <a:lumOff val="1765"/>
+            <a:alphaOff val="0"/>
+          </a:schemeClr>
+        </a:solidFill>
+        <a:ln>
+          <a:noFill/>
+        </a:ln>
+        <a:effectLst/>
+      </dsp:spPr>
+      <dsp:style>
+        <a:lnRef idx="0">
+          <a:scrgbClr r="0" g="0" b="0"/>
+        </a:lnRef>
+        <a:fillRef idx="1">
+          <a:scrgbClr r="0" g="0" b="0"/>
+        </a:fillRef>
+        <a:effectRef idx="1">
+          <a:scrgbClr r="0" g="0" b="0"/>
+        </a:effectRef>
+        <a:fontRef idx="minor">
+          <a:schemeClr val="lt1"/>
+        </a:fontRef>
+      </dsp:style>
+      <dsp:txBody>
+        <a:bodyPr spcFirstLastPara="0" vert="horz" wrap="square" lIns="0" tIns="0" rIns="0" bIns="0" numCol="1" spcCol="1270" anchor="ctr" anchorCtr="0">
+          <a:noAutofit/>
+        </a:bodyPr>
+        <a:lstStyle/>
+        <a:p>
+          <a:pPr lvl="0" algn="ctr" defTabSz="577850">
+            <a:lnSpc>
+              <a:spcPct val="90000"/>
+            </a:lnSpc>
+            <a:spcBef>
+              <a:spcPct val="0"/>
+            </a:spcBef>
+            <a:spcAft>
+              <a:spcPct val="35000"/>
+            </a:spcAft>
+          </a:pPr>
+          <a:endParaRPr lang="pt-BR" sz="1300" kern="1200"/>
+        </a:p>
+      </dsp:txBody>
+      <dsp:txXfrm>
+        <a:off x="2280305" y="1435905"/>
+        <a:ext cx="277640" cy="301763"/>
+      </dsp:txXfrm>
+    </dsp:sp>
   </dsp:spTree>
 </dsp:drawing>
 </file>
@@ -2846,7 +3434,7 @@
           <a:p>
             <a:fld id="{ED95D740-6A7E-4AE4-809A-1783B6BB9E99}" type="datetimeFigureOut">
               <a:rPr lang="pt-BR" smtClean="0"/>
-              <a:t>07/05/2014</a:t>
+              <a:t>12/05/2014</a:t>
             </a:fld>
             <a:endParaRPr lang="pt-BR" dirty="0"/>
           </a:p>
@@ -3038,7 +3626,7 @@
               <a:pPr>
                 <a:defRPr/>
               </a:pPr>
-              <a:t>07/05/2014</a:t>
+              <a:t>12/05/2014</a:t>
             </a:fld>
             <a:endParaRPr lang="pt-BR" dirty="0"/>
           </a:p>
@@ -7800,7 +8388,7 @@
           <a:bodyPr/>
           <a:lstStyle/>
           <a:p>
-            <a:endParaRPr lang="pt-BR"/>
+            <a:endParaRPr lang="pt-BR" dirty="0"/>
           </a:p>
         </p:txBody>
       </p:sp>
@@ -10472,7 +11060,7 @@
               <a:pPr>
                 <a:defRPr/>
               </a:pPr>
-              <a:t>07/05/2014</a:t>
+              <a:t>12/05/2014</a:t>
             </a:fld>
             <a:endParaRPr lang="pt-BR" dirty="0"/>
           </a:p>
@@ -10827,7 +11415,7 @@
               <a:pPr>
                 <a:defRPr/>
               </a:pPr>
-              <a:t>07/05/2014</a:t>
+              <a:t>12/05/2014</a:t>
             </a:fld>
             <a:endParaRPr lang="pt-BR" dirty="0"/>
           </a:p>
@@ -11152,7 +11740,7 @@
               <a:pPr>
                 <a:defRPr/>
               </a:pPr>
-              <a:t>07/05/2014</a:t>
+              <a:t>12/05/2014</a:t>
             </a:fld>
             <a:endParaRPr lang="pt-BR" dirty="0"/>
           </a:p>
@@ -11556,7 +12144,7 @@
               <a:pPr>
                 <a:defRPr/>
               </a:pPr>
-              <a:t>07/05/2014</a:t>
+              <a:t>12/05/2014</a:t>
             </a:fld>
             <a:endParaRPr lang="pt-BR" dirty="0"/>
           </a:p>
@@ -11899,7 +12487,7 @@
               <a:pPr>
                 <a:defRPr/>
               </a:pPr>
-              <a:t>07/05/2014</a:t>
+              <a:t>12/05/2014</a:t>
             </a:fld>
             <a:endParaRPr lang="pt-BR" dirty="0"/>
           </a:p>
@@ -12431,7 +13019,7 @@
               <a:pPr>
                 <a:defRPr/>
               </a:pPr>
-              <a:t>07/05/2014</a:t>
+              <a:t>12/05/2014</a:t>
             </a:fld>
             <a:endParaRPr lang="pt-BR" dirty="0"/>
           </a:p>
@@ -13039,7 +13627,7 @@
               <a:pPr>
                 <a:defRPr/>
               </a:pPr>
-              <a:t>07/05/2014</a:t>
+              <a:t>12/05/2014</a:t>
             </a:fld>
             <a:endParaRPr lang="pt-BR" dirty="0"/>
           </a:p>
@@ -13307,7 +13895,7 @@
               <a:pPr>
                 <a:defRPr/>
               </a:pPr>
-              <a:t>07/05/2014</a:t>
+              <a:t>12/05/2014</a:t>
             </a:fld>
             <a:endParaRPr lang="pt-BR" dirty="0"/>
           </a:p>
@@ -13429,7 +14017,7 @@
               <a:pPr>
                 <a:defRPr/>
               </a:pPr>
-              <a:t>07/05/2014</a:t>
+              <a:t>12/05/2014</a:t>
             </a:fld>
             <a:endParaRPr lang="pt-BR" dirty="0"/>
           </a:p>
@@ -13753,7 +14341,7 @@
               <a:pPr>
                 <a:defRPr/>
               </a:pPr>
-              <a:t>07/05/2014</a:t>
+              <a:t>12/05/2014</a:t>
             </a:fld>
             <a:endParaRPr lang="pt-BR" dirty="0"/>
           </a:p>
@@ -14040,7 +14628,7 @@
               <a:pPr>
                 <a:defRPr/>
               </a:pPr>
-              <a:t>07/05/2014</a:t>
+              <a:t>12/05/2014</a:t>
             </a:fld>
             <a:endParaRPr lang="pt-BR" dirty="0"/>
           </a:p>
@@ -14333,7 +14921,7 @@
               <a:pPr>
                 <a:defRPr/>
               </a:pPr>
-              <a:t>07/05/2014</a:t>
+              <a:t>12/05/2014</a:t>
             </a:fld>
             <a:endParaRPr lang="pt-BR" dirty="0"/>
           </a:p>
@@ -31985,10 +32573,16 @@
               </a:spcBef>
             </a:pPr>
             <a:r>
+              <a:rPr lang="pt-BR" sz="3000" b="1" dirty="0" smtClean="0">
+                <a:sym typeface="Arial" panose="020B0604020202020204" pitchFamily="34" charset="0"/>
+              </a:rPr>
+              <a:t>Colunas deveriam </a:t>
+            </a:r>
+            <a:r>
               <a:rPr lang="pt-BR" sz="3000" b="1" dirty="0">
                 <a:sym typeface="Arial" panose="020B0604020202020204" pitchFamily="34" charset="0"/>
               </a:rPr>
-              <a:t>Linhas deveriam possuir menos de 100 caracteres</a:t>
+              <a:t>possuir menos de 100 caracteres</a:t>
             </a:r>
           </a:p>
           <a:p>
@@ -39468,7 +40062,26 @@
             </a:r>
             <a:r>
               <a:rPr lang="pt-BR" sz="2800" dirty="0"/>
-              <a:t>, caso não, aproveite a técnica”</a:t>
+              <a:t>, caso não, aproveite a técnica</a:t>
+            </a:r>
+            <a:r>
+              <a:rPr lang="pt-BR" sz="2800" dirty="0" smtClean="0"/>
+              <a:t>”</a:t>
+            </a:r>
+          </a:p>
+          <a:p>
+            <a:pPr algn="r"/>
+            <a:r>
+              <a:rPr lang="pt-BR" sz="2800" dirty="0" smtClean="0">
+                <a:sym typeface="Arial" panose="020B0604020202020204" pitchFamily="34" charset="0"/>
+              </a:rPr>
+              <a:t>Kent </a:t>
+            </a:r>
+            <a:r>
+              <a:rPr lang="pt-BR" sz="2800" dirty="0" err="1" smtClean="0">
+                <a:sym typeface="Arial" panose="020B0604020202020204" pitchFamily="34" charset="0"/>
+              </a:rPr>
+              <a:t>Benk</a:t>
             </a:r>
             <a:endParaRPr lang="pt-BR" sz="2800" dirty="0">
               <a:sym typeface="Arial" panose="020B0604020202020204" pitchFamily="34" charset="0"/>
@@ -40854,9 +41467,15 @@
               <a:rPr lang="pt-BR" sz="2800" dirty="0">
                 <a:hlinkClick r:id="rId3"/>
               </a:rPr>
-              <a:t>http://wiki.java.net/bin/view/People/SmellsToRefactorings</a:t>
-            </a:r>
-            <a:endParaRPr lang="pt-BR" sz="2800" dirty="0"/>
+              <a:t>http://</a:t>
+            </a:r>
+            <a:r>
+              <a:rPr lang="pt-BR" sz="2800" dirty="0" smtClean="0">
+                <a:hlinkClick r:id="rId3"/>
+              </a:rPr>
+              <a:t>www.industriallogic.com/wp-content/uploads/2005/09/smellstorefactorings.pdf</a:t>
+            </a:r>
+            <a:endParaRPr lang="pt-BR" sz="2800" dirty="0" smtClean="0"/>
           </a:p>
           <a:p>
             <a:pPr algn="just" defTabSz="912813">

</xml_diff>